<commit_message>
Update Presentation of proposal.pptx
</commit_message>
<xml_diff>
--- a/Presentation of proposal.pptx
+++ b/Presentation of proposal.pptx
@@ -5,7 +5,7 @@
     <p:sldMasterId id="2147483648" r:id="rId1"/>
   </p:sldMasterIdLst>
   <p:notesMasterIdLst>
-    <p:notesMasterId r:id="rId9"/>
+    <p:notesMasterId r:id="rId10"/>
   </p:notesMasterIdLst>
   <p:sldIdLst>
     <p:sldId id="256" r:id="rId2"/>
@@ -15,6 +15,7 @@
     <p:sldId id="260" r:id="rId6"/>
     <p:sldId id="261" r:id="rId7"/>
     <p:sldId id="262" r:id="rId8"/>
+    <p:sldId id="263" r:id="rId9"/>
   </p:sldIdLst>
   <p:sldSz cx="12192000" cy="6858000"/>
   <p:notesSz cx="6858000" cy="9144000"/>
@@ -4653,7 +4654,7 @@
           <a:p>
             <a:fld id="{CAA43551-4512-7144-B96C-DE0D10C873E8}" type="datetimeFigureOut">
               <a:rPr lang="en-US" smtClean="0"/>
-              <a:t>2/13/23</a:t>
+              <a:t>2/22/23</a:t>
             </a:fld>
             <a:endParaRPr lang="en-US"/>
           </a:p>
@@ -5154,7 +5155,7 @@
           <a:p>
             <a:fld id="{3DBFFAE8-E8D5-8B46-A32A-441CDDC64DCC}" type="datetimeFigureOut">
               <a:rPr lang="en-US" smtClean="0"/>
-              <a:t>2/13/23</a:t>
+              <a:t>2/22/23</a:t>
             </a:fld>
             <a:endParaRPr lang="en-US"/>
           </a:p>
@@ -5354,7 +5355,7 @@
           <a:p>
             <a:fld id="{3DBFFAE8-E8D5-8B46-A32A-441CDDC64DCC}" type="datetimeFigureOut">
               <a:rPr lang="en-US" smtClean="0"/>
-              <a:t>2/13/23</a:t>
+              <a:t>2/22/23</a:t>
             </a:fld>
             <a:endParaRPr lang="en-US"/>
           </a:p>
@@ -5564,7 +5565,7 @@
           <a:p>
             <a:fld id="{3DBFFAE8-E8D5-8B46-A32A-441CDDC64DCC}" type="datetimeFigureOut">
               <a:rPr lang="en-US" smtClean="0"/>
-              <a:t>2/13/23</a:t>
+              <a:t>2/22/23</a:t>
             </a:fld>
             <a:endParaRPr lang="en-US"/>
           </a:p>
@@ -5764,7 +5765,7 @@
           <a:p>
             <a:fld id="{3DBFFAE8-E8D5-8B46-A32A-441CDDC64DCC}" type="datetimeFigureOut">
               <a:rPr lang="en-US" smtClean="0"/>
-              <a:t>2/13/23</a:t>
+              <a:t>2/22/23</a:t>
             </a:fld>
             <a:endParaRPr lang="en-US"/>
           </a:p>
@@ -6040,7 +6041,7 @@
           <a:p>
             <a:fld id="{3DBFFAE8-E8D5-8B46-A32A-441CDDC64DCC}" type="datetimeFigureOut">
               <a:rPr lang="en-US" smtClean="0"/>
-              <a:t>2/13/23</a:t>
+              <a:t>2/22/23</a:t>
             </a:fld>
             <a:endParaRPr lang="en-US"/>
           </a:p>
@@ -6308,7 +6309,7 @@
           <a:p>
             <a:fld id="{3DBFFAE8-E8D5-8B46-A32A-441CDDC64DCC}" type="datetimeFigureOut">
               <a:rPr lang="en-US" smtClean="0"/>
-              <a:t>2/13/23</a:t>
+              <a:t>2/22/23</a:t>
             </a:fld>
             <a:endParaRPr lang="en-US"/>
           </a:p>
@@ -6723,7 +6724,7 @@
           <a:p>
             <a:fld id="{3DBFFAE8-E8D5-8B46-A32A-441CDDC64DCC}" type="datetimeFigureOut">
               <a:rPr lang="en-US" smtClean="0"/>
-              <a:t>2/13/23</a:t>
+              <a:t>2/22/23</a:t>
             </a:fld>
             <a:endParaRPr lang="en-US"/>
           </a:p>
@@ -6865,7 +6866,7 @@
           <a:p>
             <a:fld id="{3DBFFAE8-E8D5-8B46-A32A-441CDDC64DCC}" type="datetimeFigureOut">
               <a:rPr lang="en-US" smtClean="0"/>
-              <a:t>2/13/23</a:t>
+              <a:t>2/22/23</a:t>
             </a:fld>
             <a:endParaRPr lang="en-US"/>
           </a:p>
@@ -6978,7 +6979,7 @@
           <a:p>
             <a:fld id="{3DBFFAE8-E8D5-8B46-A32A-441CDDC64DCC}" type="datetimeFigureOut">
               <a:rPr lang="en-US" smtClean="0"/>
-              <a:t>2/13/23</a:t>
+              <a:t>2/22/23</a:t>
             </a:fld>
             <a:endParaRPr lang="en-US"/>
           </a:p>
@@ -7291,7 +7292,7 @@
           <a:p>
             <a:fld id="{3DBFFAE8-E8D5-8B46-A32A-441CDDC64DCC}" type="datetimeFigureOut">
               <a:rPr lang="en-US" smtClean="0"/>
-              <a:t>2/13/23</a:t>
+              <a:t>2/22/23</a:t>
             </a:fld>
             <a:endParaRPr lang="en-US"/>
           </a:p>
@@ -7580,7 +7581,7 @@
           <a:p>
             <a:fld id="{3DBFFAE8-E8D5-8B46-A32A-441CDDC64DCC}" type="datetimeFigureOut">
               <a:rPr lang="en-US" smtClean="0"/>
-              <a:t>2/13/23</a:t>
+              <a:t>2/22/23</a:t>
             </a:fld>
             <a:endParaRPr lang="en-US"/>
           </a:p>
@@ -7823,7 +7824,7 @@
           <a:p>
             <a:fld id="{3DBFFAE8-E8D5-8B46-A32A-441CDDC64DCC}" type="datetimeFigureOut">
               <a:rPr lang="en-US" smtClean="0"/>
-              <a:t>2/13/23</a:t>
+              <a:t>2/22/23</a:t>
             </a:fld>
             <a:endParaRPr lang="en-US"/>
           </a:p>
@@ -8226,6 +8227,14 @@
 <file path=ppt/slides/slide1.xml><?xml version="1.0" encoding="utf-8"?>
 <p:sld xmlns:a="http://schemas.openxmlformats.org/drawingml/2006/main" xmlns:r="http://schemas.openxmlformats.org/officeDocument/2006/relationships" xmlns:p="http://schemas.openxmlformats.org/presentationml/2006/main">
   <p:cSld>
+    <p:bg>
+      <p:bgPr>
+        <a:solidFill>
+          <a:schemeClr val="bg1"/>
+        </a:solidFill>
+        <a:effectLst/>
+      </p:bgPr>
+    </p:bg>
     <p:spTree>
       <p:nvGrpSpPr>
         <p:cNvPr id="1" name=""/>
@@ -8240,6 +8249,66 @@
           <a:chExt cx="0" cy="0"/>
         </a:xfrm>
       </p:grpSpPr>
+      <p:sp useBgFill="1">
+        <p:nvSpPr>
+          <p:cNvPr id="1045" name="Rectangle 1035">
+            <a:extLst>
+              <a:ext uri="{FF2B5EF4-FFF2-40B4-BE49-F238E27FC236}">
+                <a16:creationId xmlns:a16="http://schemas.microsoft.com/office/drawing/2014/main" id="{3AFE8227-C443-417B-BA91-520EB1EF4559}"/>
+              </a:ext>
+              <a:ext uri="{C183D7F6-B498-43B3-948B-1728B52AA6E4}">
+                <adec:decorative xmlns:adec="http://schemas.microsoft.com/office/drawing/2017/decorative" val="1"/>
+              </a:ext>
+            </a:extLst>
+          </p:cNvPr>
+          <p:cNvSpPr>
+            <a:spLocks noGrp="1" noRot="1" noChangeAspect="1" noMove="1" noResize="1" noEditPoints="1" noAdjustHandles="1" noChangeArrowheads="1" noChangeShapeType="1" noTextEdit="1"/>
+          </p:cNvSpPr>
+          <p:nvPr>
+            <p:extLst>
+              <p:ext uri="{386F3935-93C4-4BCD-93E2-E3B085C9AB24}">
+                <p16:designElem xmlns:p16="http://schemas.microsoft.com/office/powerpoint/2015/main" val="1"/>
+              </p:ext>
+            </p:extLst>
+          </p:nvPr>
+        </p:nvSpPr>
+        <p:spPr>
+          <a:xfrm>
+            <a:off x="0" y="2"/>
+            <a:ext cx="12192000" cy="6857997"/>
+          </a:xfrm>
+          <a:prstGeom prst="rect">
+            <a:avLst/>
+          </a:prstGeom>
+          <a:ln>
+            <a:noFill/>
+          </a:ln>
+        </p:spPr>
+        <p:style>
+          <a:lnRef idx="2">
+            <a:schemeClr val="accent1">
+              <a:shade val="50000"/>
+            </a:schemeClr>
+          </a:lnRef>
+          <a:fillRef idx="1">
+            <a:schemeClr val="accent1"/>
+          </a:fillRef>
+          <a:effectRef idx="0">
+            <a:schemeClr val="accent1"/>
+          </a:effectRef>
+          <a:fontRef idx="minor">
+            <a:schemeClr val="lt1"/>
+          </a:fontRef>
+        </p:style>
+        <p:txBody>
+          <a:bodyPr rtlCol="0" anchor="ctr"/>
+          <a:lstStyle/>
+          <a:p>
+            <a:pPr algn="ctr"/>
+            <a:endParaRPr lang="en-US"/>
+          </a:p>
+        </p:txBody>
+      </p:sp>
       <p:sp>
         <p:nvSpPr>
           <p:cNvPr id="2" name="Title 1">
@@ -8256,18 +8325,71 @@
             <p:ph type="ctrTitle"/>
           </p:nvPr>
         </p:nvSpPr>
-        <p:spPr/>
+        <p:spPr>
+          <a:xfrm>
+            <a:off x="8643193" y="489507"/>
+            <a:ext cx="3091607" cy="1655483"/>
+          </a:xfrm>
+        </p:spPr>
         <p:txBody>
-          <a:bodyPr/>
+          <a:bodyPr vert="horz" lIns="91440" tIns="45720" rIns="91440" bIns="45720" rtlCol="0" anchor="b">
+            <a:normAutofit/>
+          </a:bodyPr>
           <a:lstStyle/>
           <a:p>
+            <a:pPr algn="l"/>
             <a:r>
-              <a:rPr lang="en-US" dirty="0"/>
+              <a:rPr lang="en-US" sz="4000"/>
               <a:t>FORM 2 STEM PROJECT</a:t>
             </a:r>
           </a:p>
         </p:txBody>
       </p:sp>
+      <p:pic>
+        <p:nvPicPr>
+          <p:cNvPr id="1026" name="Picture 2" descr="Sustainable Development Goals">
+            <a:extLst>
+              <a:ext uri="{FF2B5EF4-FFF2-40B4-BE49-F238E27FC236}">
+                <a16:creationId xmlns:a16="http://schemas.microsoft.com/office/drawing/2014/main" id="{4E9D4321-B1BC-0D99-65C4-CDCB5FA166C9}"/>
+              </a:ext>
+            </a:extLst>
+          </p:cNvPr>
+          <p:cNvPicPr>
+            <a:picLocks noChangeAspect="1" noChangeArrowheads="1"/>
+          </p:cNvPicPr>
+          <p:nvPr/>
+        </p:nvPicPr>
+        <p:blipFill rotWithShape="1">
+          <a:blip r:embed="rId2">
+            <a:extLst>
+              <a:ext uri="{28A0092B-C50C-407E-A947-70E740481C1C}">
+                <a14:useLocalDpi xmlns:a14="http://schemas.microsoft.com/office/drawing/2010/main" val="0"/>
+              </a:ext>
+            </a:extLst>
+          </a:blip>
+          <a:srcRect l="8880" r="6589" b="-1"/>
+          <a:stretch/>
+        </p:blipFill>
+        <p:spPr bwMode="auto">
+          <a:xfrm>
+            <a:off x="20" y="431"/>
+            <a:ext cx="8115280" cy="6408311"/>
+          </a:xfrm>
+          <a:prstGeom prst="rect">
+            <a:avLst/>
+          </a:prstGeom>
+          <a:noFill/>
+          <a:extLst>
+            <a:ext uri="{909E8E84-426E-40DD-AFC4-6F175D3DCCD1}">
+              <a14:hiddenFill xmlns:a14="http://schemas.microsoft.com/office/drawing/2010/main">
+                <a:solidFill>
+                  <a:srgbClr val="FFFFFF"/>
+                </a:solidFill>
+              </a14:hiddenFill>
+            </a:ext>
+          </a:extLst>
+        </p:spPr>
+      </p:pic>
       <p:sp>
         <p:nvSpPr>
           <p:cNvPr id="3" name="Subtitle 2">
@@ -8284,35 +8406,205 @@
             <p:ph type="subTitle" idx="1"/>
           </p:nvPr>
         </p:nvSpPr>
-        <p:spPr/>
+        <p:spPr>
+          <a:xfrm>
+            <a:off x="8643193" y="2418408"/>
+            <a:ext cx="2942813" cy="3540265"/>
+          </a:xfrm>
+        </p:spPr>
         <p:txBody>
-          <a:bodyPr>
-            <a:normAutofit lnSpcReduction="10000"/>
+          <a:bodyPr vert="horz" lIns="91440" tIns="45720" rIns="91440" bIns="45720" rtlCol="0">
+            <a:normAutofit/>
           </a:bodyPr>
           <a:lstStyle/>
           <a:p>
+            <a:pPr indent="-228600" algn="l">
+              <a:buFont typeface="Arial" panose="020B0604020202020204" pitchFamily="34" charset="0"/>
+              <a:buChar char="•"/>
+            </a:pPr>
             <a:r>
-              <a:rPr lang="en-US" dirty="0"/>
+              <a:rPr lang="en-US" sz="2000" dirty="0"/>
               <a:t>Chan Tsz Him ( 4 )</a:t>
             </a:r>
           </a:p>
           <a:p>
+            <a:pPr indent="-228600" algn="l">
+              <a:buFont typeface="Arial" panose="020B0604020202020204" pitchFamily="34" charset="0"/>
+              <a:buChar char="•"/>
+            </a:pPr>
             <a:r>
-              <a:rPr lang="en-US" dirty="0"/>
+              <a:rPr lang="en-US" sz="2000" dirty="0"/>
               <a:t>Lemuel Ma ( 18 )</a:t>
             </a:r>
           </a:p>
           <a:p>
+            <a:pPr indent="-228600" algn="l">
+              <a:buFont typeface="Arial" panose="020B0604020202020204" pitchFamily="34" charset="0"/>
+              <a:buChar char="•"/>
+            </a:pPr>
             <a:r>
-              <a:rPr lang="en-US" dirty="0"/>
+              <a:rPr lang="en-US" sz="2000" dirty="0"/>
               <a:t>Ben Liu ( 17 )</a:t>
             </a:r>
           </a:p>
           <a:p>
+            <a:pPr indent="-228600" algn="l">
+              <a:buFont typeface="Arial" panose="020B0604020202020204" pitchFamily="34" charset="0"/>
+              <a:buChar char="•"/>
+            </a:pPr>
             <a:r>
-              <a:rPr lang="en-US" dirty="0"/>
+              <a:rPr lang="en-US" sz="2000" dirty="0"/>
               <a:t>Tam Yu Ji ( 24 )</a:t>
             </a:r>
+          </a:p>
+        </p:txBody>
+      </p:sp>
+      <p:sp>
+        <p:nvSpPr>
+          <p:cNvPr id="1046" name="Rectangle 1037">
+            <a:extLst>
+              <a:ext uri="{FF2B5EF4-FFF2-40B4-BE49-F238E27FC236}">
+                <a16:creationId xmlns:a16="http://schemas.microsoft.com/office/drawing/2014/main" id="{907741FC-B544-4A6E-B831-6789D042333D}"/>
+              </a:ext>
+              <a:ext uri="{C183D7F6-B498-43B3-948B-1728B52AA6E4}">
+                <adec:decorative xmlns:adec="http://schemas.microsoft.com/office/drawing/2017/decorative" val="1"/>
+              </a:ext>
+            </a:extLst>
+          </p:cNvPr>
+          <p:cNvSpPr>
+            <a:spLocks noGrp="1" noRot="1" noChangeAspect="1" noMove="1" noResize="1" noEditPoints="1" noAdjustHandles="1" noChangeArrowheads="1" noChangeShapeType="1" noTextEdit="1"/>
+          </p:cNvSpPr>
+          <p:nvPr>
+            <p:extLst>
+              <p:ext uri="{386F3935-93C4-4BCD-93E2-E3B085C9AB24}">
+                <p16:designElem xmlns:p16="http://schemas.microsoft.com/office/powerpoint/2015/main" val="1"/>
+              </p:ext>
+            </p:extLst>
+          </p:nvPr>
+        </p:nvSpPr>
+        <p:spPr>
+          <a:xfrm flipH="1">
+            <a:off x="-1" y="6408741"/>
+            <a:ext cx="12191998" cy="457202"/>
+          </a:xfrm>
+          <a:prstGeom prst="rect">
+            <a:avLst/>
+          </a:prstGeom>
+          <a:gradFill>
+            <a:gsLst>
+              <a:gs pos="34000">
+                <a:srgbClr val="000000">
+                  <a:alpha val="96000"/>
+                </a:srgbClr>
+              </a:gs>
+              <a:gs pos="100000">
+                <a:schemeClr val="accent1"/>
+              </a:gs>
+            </a:gsLst>
+            <a:lin ang="8400000" scaled="0"/>
+          </a:gradFill>
+          <a:ln>
+            <a:noFill/>
+          </a:ln>
+        </p:spPr>
+        <p:style>
+          <a:lnRef idx="2">
+            <a:schemeClr val="accent1">
+              <a:shade val="50000"/>
+            </a:schemeClr>
+          </a:lnRef>
+          <a:fillRef idx="1">
+            <a:schemeClr val="accent1"/>
+          </a:fillRef>
+          <a:effectRef idx="0">
+            <a:schemeClr val="accent1"/>
+          </a:effectRef>
+          <a:fontRef idx="minor">
+            <a:schemeClr val="lt1"/>
+          </a:fontRef>
+        </p:style>
+        <p:txBody>
+          <a:bodyPr rtlCol="0" anchor="ctr"/>
+          <a:lstStyle/>
+          <a:p>
+            <a:pPr algn="ctr"/>
+            <a:endParaRPr lang="en-US"/>
+          </a:p>
+        </p:txBody>
+      </p:sp>
+      <p:sp>
+        <p:nvSpPr>
+          <p:cNvPr id="1040" name="Rectangle 1039">
+            <a:extLst>
+              <a:ext uri="{FF2B5EF4-FFF2-40B4-BE49-F238E27FC236}">
+                <a16:creationId xmlns:a16="http://schemas.microsoft.com/office/drawing/2014/main" id="{3F0BE7ED-7814-4273-B18A-F26CC0380380}"/>
+              </a:ext>
+              <a:ext uri="{C183D7F6-B498-43B3-948B-1728B52AA6E4}">
+                <adec:decorative xmlns:adec="http://schemas.microsoft.com/office/drawing/2017/decorative" val="1"/>
+              </a:ext>
+            </a:extLst>
+          </p:cNvPr>
+          <p:cNvSpPr>
+            <a:spLocks noGrp="1" noRot="1" noChangeAspect="1" noMove="1" noResize="1" noEditPoints="1" noAdjustHandles="1" noChangeArrowheads="1" noChangeShapeType="1" noTextEdit="1"/>
+          </p:cNvSpPr>
+          <p:nvPr>
+            <p:extLst>
+              <p:ext uri="{386F3935-93C4-4BCD-93E2-E3B085C9AB24}">
+                <p16:designElem xmlns:p16="http://schemas.microsoft.com/office/powerpoint/2015/main" val="1"/>
+              </p:ext>
+            </p:extLst>
+          </p:nvPr>
+        </p:nvSpPr>
+        <p:spPr>
+          <a:xfrm flipH="1">
+            <a:off x="-4" y="6408742"/>
+            <a:ext cx="8115300" cy="449258"/>
+          </a:xfrm>
+          <a:prstGeom prst="rect">
+            <a:avLst/>
+          </a:prstGeom>
+          <a:gradFill>
+            <a:gsLst>
+              <a:gs pos="28000">
+                <a:schemeClr val="accent1">
+                  <a:lumMod val="75000"/>
+                  <a:alpha val="59000"/>
+                </a:schemeClr>
+              </a:gs>
+              <a:gs pos="100000">
+                <a:srgbClr val="000000">
+                  <a:alpha val="70000"/>
+                </a:srgbClr>
+              </a:gs>
+            </a:gsLst>
+            <a:lin ang="11400000" scaled="0"/>
+          </a:gradFill>
+          <a:ln>
+            <a:noFill/>
+          </a:ln>
+        </p:spPr>
+        <p:style>
+          <a:lnRef idx="2">
+            <a:schemeClr val="accent1">
+              <a:shade val="50000"/>
+            </a:schemeClr>
+          </a:lnRef>
+          <a:fillRef idx="1">
+            <a:schemeClr val="accent1"/>
+          </a:fillRef>
+          <a:effectRef idx="0">
+            <a:schemeClr val="accent1"/>
+          </a:effectRef>
+          <a:fontRef idx="minor">
+            <a:schemeClr val="lt1"/>
+          </a:fontRef>
+        </p:style>
+        <p:txBody>
+          <a:bodyPr rtlCol="0" anchor="ctr"/>
+          <a:lstStyle/>
+          <a:p>
+            <a:pPr algn="ctr"/>
+            <a:endParaRPr lang="en-US"/>
           </a:p>
         </p:txBody>
       </p:sp>
@@ -10208,96 +10500,114 @@
           </a:p>
         </p:txBody>
       </p:sp>
-      <p:pic>
-        <p:nvPicPr>
-          <p:cNvPr id="4" name="Content Placeholder 4" descr="Diagram&#10;&#10;Description automatically generated">
+    </p:spTree>
+    <p:extLst>
+      <p:ext uri="{BB962C8B-B14F-4D97-AF65-F5344CB8AC3E}">
+        <p14:creationId xmlns:p14="http://schemas.microsoft.com/office/powerpoint/2010/main" val="2153288797"/>
+      </p:ext>
+    </p:extLst>
+  </p:cSld>
+  <p:clrMapOvr>
+    <a:masterClrMapping/>
+  </p:clrMapOvr>
+</p:sld>
+</file>
+
+<file path=ppt/slides/slide8.xml><?xml version="1.0" encoding="utf-8"?>
+<p:sld xmlns:a="http://schemas.openxmlformats.org/drawingml/2006/main" xmlns:r="http://schemas.openxmlformats.org/officeDocument/2006/relationships" xmlns:p="http://schemas.openxmlformats.org/presentationml/2006/main">
+  <p:cSld>
+    <p:spTree>
+      <p:nvGrpSpPr>
+        <p:cNvPr id="1" name=""/>
+        <p:cNvGrpSpPr/>
+        <p:nvPr/>
+      </p:nvGrpSpPr>
+      <p:grpSpPr>
+        <a:xfrm>
+          <a:off x="0" y="0"/>
+          <a:ext cx="0" cy="0"/>
+          <a:chOff x="0" y="0"/>
+          <a:chExt cx="0" cy="0"/>
+        </a:xfrm>
+      </p:grpSpPr>
+      <p:sp>
+        <p:nvSpPr>
+          <p:cNvPr id="2" name="Title 1">
             <a:extLst>
               <a:ext uri="{FF2B5EF4-FFF2-40B4-BE49-F238E27FC236}">
-                <a16:creationId xmlns:a16="http://schemas.microsoft.com/office/drawing/2014/main" id="{849873E3-29EF-8299-CC3D-F7226148881D}"/>
+                <a16:creationId xmlns:a16="http://schemas.microsoft.com/office/drawing/2014/main" id="{03843171-2113-3670-1ECD-85DBA1A494B0}"/>
               </a:ext>
             </a:extLst>
           </p:cNvPr>
-          <p:cNvPicPr>
-            <a:picLocks noChangeAspect="1"/>
-          </p:cNvPicPr>
-          <p:nvPr/>
-        </p:nvPicPr>
-        <p:blipFill>
-          <a:blip r:embed="rId2"/>
-          <a:stretch>
-            <a:fillRect/>
-          </a:stretch>
-        </p:blipFill>
-        <p:spPr>
-          <a:xfrm>
-            <a:off x="6758740" y="119785"/>
-            <a:ext cx="4018548" cy="5679930"/>
-          </a:xfrm>
-          <a:prstGeom prst="rect">
-            <a:avLst/>
-          </a:prstGeom>
-          <a:effectLst/>
-        </p:spPr>
-      </p:pic>
+          <p:cNvSpPr>
+            <a:spLocks noGrp="1"/>
+          </p:cNvSpPr>
+          <p:nvPr>
+            <p:ph type="title"/>
+          </p:nvPr>
+        </p:nvSpPr>
+        <p:spPr/>
+        <p:txBody>
+          <a:bodyPr/>
+          <a:lstStyle/>
+          <a:p>
+            <a:r>
+              <a:rPr lang="en-US" dirty="0"/>
+              <a:t>Future of the Project</a:t>
+            </a:r>
+          </a:p>
+        </p:txBody>
+      </p:sp>
       <p:sp>
         <p:nvSpPr>
-          <p:cNvPr id="5" name="Title 1">
+          <p:cNvPr id="3" name="Content Placeholder 2">
             <a:extLst>
               <a:ext uri="{FF2B5EF4-FFF2-40B4-BE49-F238E27FC236}">
-                <a16:creationId xmlns:a16="http://schemas.microsoft.com/office/drawing/2014/main" id="{A1AE11B4-F761-EF75-9D66-A2EE31D54641}"/>
+                <a16:creationId xmlns:a16="http://schemas.microsoft.com/office/drawing/2014/main" id="{00ED3013-A6AF-CBD0-530F-1B15895B6609}"/>
               </a:ext>
             </a:extLst>
           </p:cNvPr>
-          <p:cNvSpPr txBox="1">
-            <a:spLocks/>
+          <p:cNvSpPr>
+            <a:spLocks noGrp="1"/>
           </p:cNvSpPr>
-          <p:nvPr/>
+          <p:nvPr>
+            <p:ph idx="1"/>
+          </p:nvPr>
         </p:nvSpPr>
-        <p:spPr>
-          <a:xfrm>
-            <a:off x="6758740" y="5245203"/>
-            <a:ext cx="3505495" cy="1622321"/>
-          </a:xfrm>
-          <a:prstGeom prst="rect">
-            <a:avLst/>
-          </a:prstGeom>
-        </p:spPr>
+        <p:spPr/>
         <p:txBody>
-          <a:bodyPr vert="horz" lIns="91440" tIns="45720" rIns="91440" bIns="45720" rtlCol="0" anchor="ctr">
-            <a:normAutofit/>
-          </a:bodyPr>
-          <a:lstStyle>
-            <a:lvl1pPr algn="l" defTabSz="914400" rtl="0" eaLnBrk="1" latinLnBrk="0" hangingPunct="1">
-              <a:lnSpc>
-                <a:spcPct val="90000"/>
-              </a:lnSpc>
-              <a:spcBef>
-                <a:spcPct val="0"/>
-              </a:spcBef>
-              <a:buNone/>
-              <a:defRPr sz="4400" kern="1200">
-                <a:solidFill>
-                  <a:schemeClr val="tx1"/>
-                </a:solidFill>
-                <a:latin typeface="+mj-lt"/>
-                <a:ea typeface="+mj-ea"/>
-                <a:cs typeface="+mj-cs"/>
-              </a:defRPr>
-            </a:lvl1pPr>
-          </a:lstStyle>
+          <a:bodyPr/>
+          <a:lstStyle/>
           <a:p>
             <a:r>
-              <a:rPr lang="en-US"/>
-              <a:t>Basic Design</a:t>
+              <a:rPr lang="en-US" dirty="0"/>
+              <a:t>Fume Cupboard</a:t>
             </a:r>
+          </a:p>
+          <a:p>
             <a:endParaRPr lang="en-US" dirty="0"/>
+          </a:p>
+          <a:p>
+            <a:r>
+              <a:rPr lang="en-US" dirty="0"/>
+              <a:t>Update the data using the internet wirelessly with ESP32</a:t>
+            </a:r>
+          </a:p>
+          <a:p>
+            <a:endParaRPr lang="en-US" dirty="0"/>
+          </a:p>
+          <a:p>
+            <a:r>
+              <a:rPr lang="en-US" dirty="0"/>
+              <a:t>Test for present of gas in experiment</a:t>
+            </a:r>
           </a:p>
         </p:txBody>
       </p:sp>
     </p:spTree>
     <p:extLst>
       <p:ext uri="{BB962C8B-B14F-4D97-AF65-F5344CB8AC3E}">
-        <p14:creationId xmlns:p14="http://schemas.microsoft.com/office/powerpoint/2010/main" val="2153288797"/>
+        <p14:creationId xmlns:p14="http://schemas.microsoft.com/office/powerpoint/2010/main" val="34996753"/>
       </p:ext>
     </p:extLst>
   </p:cSld>

</xml_diff>